<commit_message>
Update the objectives + LS records
</commit_message>
<xml_diff>
--- a/interim-26022025/nmop-chairs-slides.pptx
+++ b/interim-26022025/nmop-chairs-slides.pptx
@@ -264,6 +264,43 @@
     </p:ext>
   </p:extLst>
 </p:presentation>
+</file>
+
+<file path=ppt/revisionInfo.xml><?xml version="1.0" encoding="utf-8"?>
+<p1510:revInfo xmlns:a="http://schemas.openxmlformats.org/drawingml/2006/main" xmlns:r="http://schemas.openxmlformats.org/officeDocument/2006/relationships" xmlns:p1510="http://schemas.microsoft.com/office/powerpoint/2015/10/main">
+  <p1510:revLst>
+    <p1510:client id="{0067B8D3-D34B-4351-8DF5-30D2700ECA92}" v="3" dt="2025-02-26T07:16:51.996"/>
+  </p1510:revLst>
+</p1510:revInfo>
+</file>
+
+<file path=ppt/changesInfos/changesInfo1.xml><?xml version="1.0" encoding="utf-8"?>
+<pc:chgInfo xmlns:a="http://schemas.openxmlformats.org/drawingml/2006/main" xmlns:r="http://schemas.openxmlformats.org/officeDocument/2006/relationships" xmlns:ac="http://schemas.microsoft.com/office/drawing/2013/main/command" xmlns:pc="http://schemas.microsoft.com/office/powerpoint/2013/main/command">
+  <pc:docChgLst>
+    <pc:chgData name="BOUCADAIR Mohamed INNOV/NET" userId="2acbca90-6db1-4111-98c4-832797dda751" providerId="ADAL" clId="{0067B8D3-D34B-4351-8DF5-30D2700ECA92}"/>
+    <pc:docChg chg="undo redo custSel modSld">
+      <pc:chgData name="BOUCADAIR Mohamed INNOV/NET" userId="2acbca90-6db1-4111-98c4-832797dda751" providerId="ADAL" clId="{0067B8D3-D34B-4351-8DF5-30D2700ECA92}" dt="2025-02-26T07:20:00.045" v="191" actId="313"/>
+      <pc:docMkLst>
+        <pc:docMk/>
+      </pc:docMkLst>
+      <pc:sldChg chg="modSp mod">
+        <pc:chgData name="BOUCADAIR Mohamed INNOV/NET" userId="2acbca90-6db1-4111-98c4-832797dda751" providerId="ADAL" clId="{0067B8D3-D34B-4351-8DF5-30D2700ECA92}" dt="2025-02-26T07:20:00.045" v="191" actId="313"/>
+        <pc:sldMkLst>
+          <pc:docMk/>
+          <pc:sldMk cId="2209015104" sldId="277"/>
+        </pc:sldMkLst>
+        <pc:spChg chg="mod">
+          <ac:chgData name="BOUCADAIR Mohamed INNOV/NET" userId="2acbca90-6db1-4111-98c4-832797dda751" providerId="ADAL" clId="{0067B8D3-D34B-4351-8DF5-30D2700ECA92}" dt="2025-02-26T07:20:00.045" v="191" actId="313"/>
+          <ac:spMkLst>
+            <pc:docMk/>
+            <pc:sldMk cId="2209015104" sldId="277"/>
+            <ac:spMk id="3" creationId="{3B08E921-E0A9-A022-AF7D-2240BB088939}"/>
+          </ac:spMkLst>
+        </pc:spChg>
+      </pc:sldChg>
+    </pc:docChg>
+  </pc:docChgLst>
+</pc:chgInfo>
 </file>
 
 <file path=ppt/notesMasters/notesMaster1.xml><?xml version="1.0" encoding="utf-8"?>
@@ -1547,7 +1584,7 @@
             </a:pPr>
             <a:fld id="{00000000-1234-1234-1234-123412341234}" type="slidenum">
               <a:rPr lang="en-US"/>
-              <a:t>‹#›</a:t>
+              <a:t>‹N°›</a:t>
             </a:fld>
             <a:endParaRPr/>
           </a:p>
@@ -2866,7 +2903,7 @@
             </a:pPr>
             <a:fld id="{00000000-1234-1234-1234-123412341234}" type="slidenum">
               <a:rPr lang="en-US"/>
-              <a:t>‹#›</a:t>
+              <a:t>‹N°›</a:t>
             </a:fld>
             <a:endParaRPr/>
           </a:p>
@@ -3861,7 +3898,7 @@
             </a:pPr>
             <a:fld id="{00000000-1234-1234-1234-123412341234}" type="slidenum">
               <a:rPr lang="en-US"/>
-              <a:t>‹#›</a:t>
+              <a:t>‹N°›</a:t>
             </a:fld>
             <a:endParaRPr/>
           </a:p>
@@ -4435,7 +4472,7 @@
             </a:pPr>
             <a:fld id="{00000000-1234-1234-1234-123412341234}" type="slidenum">
               <a:rPr lang="en-US"/>
-              <a:t>‹#›</a:t>
+              <a:t>‹N°›</a:t>
             </a:fld>
             <a:endParaRPr/>
           </a:p>
@@ -5671,7 +5708,7 @@
             </a:pPr>
             <a:fld id="{00000000-1234-1234-1234-123412341234}" type="slidenum">
               <a:rPr lang="en-US"/>
-              <a:t>‹#›</a:t>
+              <a:t>‹N°›</a:t>
             </a:fld>
             <a:endParaRPr/>
           </a:p>
@@ -6163,7 +6200,7 @@
             </a:pPr>
             <a:fld id="{00000000-1234-1234-1234-123412341234}" type="slidenum">
               <a:rPr lang="en-US"/>
-              <a:t>‹#›</a:t>
+              <a:t>‹N°›</a:t>
             </a:fld>
             <a:endParaRPr/>
           </a:p>
@@ -7015,7 +7052,7 @@
             </a:pPr>
             <a:fld id="{00000000-1234-1234-1234-123412341234}" type="slidenum">
               <a:rPr lang="en-US"/>
-              <a:t>‹#›</a:t>
+              <a:t>‹N°›</a:t>
             </a:fld>
             <a:endParaRPr/>
           </a:p>
@@ -7991,7 +8028,7 @@
             </a:pPr>
             <a:fld id="{00000000-1234-1234-1234-123412341234}" type="slidenum">
               <a:rPr lang="en-US"/>
-              <a:t>‹#›</a:t>
+              <a:t>‹N°›</a:t>
             </a:fld>
             <a:endParaRPr/>
           </a:p>
@@ -8285,7 +8322,7 @@
             </a:pPr>
             <a:fld id="{00000000-1234-1234-1234-123412341234}" type="slidenum">
               <a:rPr lang="en-US"/>
-              <a:t>‹#›</a:t>
+              <a:t>‹N°›</a:t>
             </a:fld>
             <a:endParaRPr/>
           </a:p>
@@ -9493,7 +9530,7 @@
             </a:pPr>
             <a:fld id="{00000000-1234-1234-1234-123412341234}" type="slidenum">
               <a:rPr lang="en-US"/>
-              <a:t>‹#›</a:t>
+              <a:t>‹N°›</a:t>
             </a:fld>
             <a:endParaRPr/>
           </a:p>
@@ -10399,7 +10436,7 @@
             </a:pPr>
             <a:fld id="{00000000-1234-1234-1234-123412341234}" type="slidenum">
               <a:rPr lang="en-US"/>
-              <a:t>‹#›</a:t>
+              <a:t>‹N°›</a:t>
             </a:fld>
             <a:endParaRPr/>
           </a:p>
@@ -11124,7 +11161,7 @@
             </a:pPr>
             <a:fld id="{00000000-1234-1234-1234-123412341234}" type="slidenum">
               <a:rPr lang="en-US"/>
-              <a:t>‹#›</a:t>
+              <a:t>‹N°›</a:t>
             </a:fld>
             <a:endParaRPr/>
           </a:p>
@@ -12119,7 +12156,7 @@
             </a:pPr>
             <a:fld id="{00000000-1234-1234-1234-123412341234}" type="slidenum">
               <a:rPr lang="en-US"/>
-              <a:t>‹#›</a:t>
+              <a:t>‹N°›</a:t>
             </a:fld>
             <a:endParaRPr/>
           </a:p>
@@ -12720,7 +12757,7 @@
             </a:pPr>
             <a:fld id="{00000000-1234-1234-1234-123412341234}" type="slidenum">
               <a:rPr lang="en-US"/>
-              <a:t>‹#›</a:t>
+              <a:t>‹N°›</a:t>
             </a:fld>
             <a:endParaRPr/>
           </a:p>
@@ -13034,7 +13071,7 @@
             </a:pPr>
             <a:fld id="{00000000-1234-1234-1234-123412341234}" type="slidenum">
               <a:rPr lang="en-US"/>
-              <a:t>‹#›</a:t>
+              <a:t>‹N°›</a:t>
             </a:fld>
             <a:endParaRPr/>
           </a:p>
@@ -15116,7 +15153,7 @@
             </a:pPr>
             <a:fld id="{00000000-1234-1234-1234-123412341234}" type="slidenum">
               <a:rPr lang="en-US"/>
-              <a:t>‹#›</a:t>
+              <a:t>‹N°›</a:t>
             </a:fld>
             <a:endParaRPr/>
           </a:p>
@@ -17054,7 +17091,7 @@
         <p:fade/>
       </p:transition>
     </mc:Choice>
-    <mc:Fallback xmlns="" xmlns:mv="urn:schemas-microsoft-com:mac:vml" xmlns:c="http://schemas.openxmlformats.org/drawingml/2006/chart" xmlns:dgm="http://schemas.openxmlformats.org/drawingml/2006/diagram" xmlns:o="urn:schemas-microsoft-com:office:office" xmlns:v="urn:schemas-microsoft-com:vml" xmlns:pvml="urn:schemas-microsoft-com:office:powerpoint" xmlns:com="http://schemas.openxmlformats.org/drawingml/2006/compatibility" xmlns:p15="http://schemas.microsoft.com/office/powerpoint/2012/main" xmlns:ahyp="http://schemas.microsoft.com/office/drawing/2018/hyperlinkcolor">
+    <mc:Fallback xmlns:ahyp="http://schemas.microsoft.com/office/drawing/2018/hyperlinkcolor" xmlns:p15="http://schemas.microsoft.com/office/powerpoint/2012/main" xmlns:com="http://schemas.openxmlformats.org/drawingml/2006/compatibility" xmlns:pvml="urn:schemas-microsoft-com:office:powerpoint" xmlns:v="urn:schemas-microsoft-com:vml" xmlns:o="urn:schemas-microsoft-com:office:office" xmlns:dgm="http://schemas.openxmlformats.org/drawingml/2006/diagram" xmlns:c="http://schemas.openxmlformats.org/drawingml/2006/chart" xmlns:mv="urn:schemas-microsoft-com:mac:vml" xmlns="">
       <p:transition spd="slow">
         <p:fade/>
       </p:transition>
@@ -17252,7 +17289,7 @@
         </p:nvSpPr>
         <p:spPr>
           <a:xfrm>
-            <a:off x="627500" y="1794600"/>
+            <a:off x="627489" y="1723929"/>
             <a:ext cx="8321518" cy="2965659"/>
           </a:xfrm>
         </p:spPr>
@@ -17262,21 +17299,65 @@
           <a:p>
             <a:r>
               <a:rPr lang="fr-FR" dirty="0"/>
-              <a:t>NMOP &amp; BBF exchange of information </a:t>
+              <a:t>NMOP &amp; BBF Initial exchange of information</a:t>
             </a:r>
           </a:p>
           <a:p>
             <a:r>
               <a:rPr lang="fr-FR" dirty="0"/>
-              <a:t>Collaboration a consistent data collection architecture for the </a:t>
+              <a:t>Collaboration to </a:t>
+            </a:r>
+            <a:r>
+              <a:rPr lang="fr-FR" b="1" i="1" dirty="0" err="1">
+                <a:solidFill>
+                  <a:srgbClr val="00B0F0"/>
+                </a:solidFill>
+              </a:rPr>
+              <a:t>ensure</a:t>
+            </a:r>
+            <a:r>
+              <a:rPr lang="fr-FR" b="1" i="1" dirty="0">
+                <a:solidFill>
+                  <a:srgbClr val="00B0F0"/>
+                </a:solidFill>
+              </a:rPr>
+              <a:t> a consistent data collection architecture </a:t>
+            </a:r>
+            <a:r>
+              <a:rPr lang="fr-FR" dirty="0"/>
+              <a:t>for the </a:t>
             </a:r>
             <a:r>
               <a:rPr lang="fr-FR" dirty="0" err="1"/>
               <a:t>industry</a:t>
             </a:r>
             <a:r>
-              <a:rPr lang="fr-FR"/>
-              <a:t>?</a:t>
+              <a:rPr lang="fr-FR" dirty="0"/>
+              <a:t> by </a:t>
+            </a:r>
+            <a:r>
+              <a:rPr lang="fr-FR" b="1" i="1" dirty="0">
+                <a:solidFill>
+                  <a:srgbClr val="00B0F0"/>
+                </a:solidFill>
+              </a:rPr>
+              <a:t>leveraging </a:t>
+            </a:r>
+            <a:r>
+              <a:rPr lang="fr-FR" b="1" i="1" dirty="0" err="1">
+                <a:solidFill>
+                  <a:srgbClr val="00B0F0"/>
+                </a:solidFill>
+              </a:rPr>
+              <a:t>common</a:t>
+            </a:r>
+            <a:r>
+              <a:rPr lang="fr-FR" b="1" i="1" dirty="0">
+                <a:solidFill>
+                  <a:srgbClr val="00B0F0"/>
+                </a:solidFill>
+              </a:rPr>
+              <a:t> building blocks</a:t>
             </a:r>
             <a:endParaRPr lang="fr-FR" dirty="0"/>
           </a:p>
@@ -17288,33 +17369,58 @@
           </a:p>
           <a:p>
             <a:r>
+              <a:rPr lang="fr-FR" dirty="0" err="1"/>
+              <a:t>LSes</a:t>
+            </a:r>
+            <a:r>
               <a:rPr lang="fr-FR" dirty="0"/>
-              <a:t>Note:</a:t>
+              <a:t> Log:</a:t>
             </a:r>
           </a:p>
           <a:p>
             <a:pPr lvl="1"/>
             <a:r>
-              <a:rPr lang="en-US" altLang="en-US" b="1" dirty="0">
-                <a:solidFill>
-                  <a:schemeClr val="tx1"/>
+              <a:rPr lang="en-US" altLang="en-US" sz="1200" b="1" dirty="0">
+                <a:solidFill>
+                  <a:srgbClr val="002060"/>
                 </a:solidFill>
                 <a:latin typeface="Arial" panose="020B0604020202020204" pitchFamily="34" charset="0"/>
               </a:rPr>
-              <a:t>IETF NMOP LS to BBF on Automated Intelligent Management (AIM), WT-508: Broadband Network Data Collection (BNDC)</a:t>
+              <a:t>IETF NMOP LS to BBF on “Automated Intelligent Management (AIM), WT-508: Broadband Network Data Collection (BNDC)”: </a:t>
             </a:r>
-            <a:br>
-              <a:rPr lang="en-US" altLang="en-US" b="1" dirty="0">
-                <a:solidFill>
-                  <a:schemeClr val="tx1"/>
-                </a:solidFill>
-                <a:latin typeface="Arial" panose="020B0604020202020204" pitchFamily="34" charset="0"/>
+            <a:r>
+              <a:rPr lang="en-US" sz="1200" b="1" dirty="0">
+                <a:hlinkClick r:id="rId2"/>
               </a:rPr>
-            </a:br>
-            <a:r>
-              <a:rPr lang="en-US" b="1" dirty="0"/>
               <a:t>https://datatracker.ietf.org/liaison/1969/</a:t>
             </a:r>
+            <a:r>
+              <a:rPr lang="en-US" sz="1200" b="1" dirty="0"/>
+              <a:t> (09/12/2024)</a:t>
+            </a:r>
+          </a:p>
+          <a:p>
+            <a:pPr lvl="1"/>
+            <a:r>
+              <a:rPr lang="en-US" sz="1200" b="1" dirty="0"/>
+              <a:t>Response to IETF NMOP on “Automated Intelligent Management (AIM)and Broadband Network Data Collection (BNDC)”: </a:t>
+            </a:r>
+            <a:r>
+              <a:rPr lang="en-US" sz="1200" b="1" dirty="0">
+                <a:hlinkClick r:id="rId3"/>
+              </a:rPr>
+              <a:t>https://datatracker.ietf.org/liaison/1975/</a:t>
+            </a:r>
+            <a:r>
+              <a:rPr lang="en-US" sz="1200" b="1" dirty="0"/>
+              <a:t>  (31/01/25)</a:t>
+            </a:r>
+          </a:p>
+          <a:p>
+            <a:pPr marL="596900" lvl="1" indent="0">
+              <a:buNone/>
+            </a:pPr>
+            <a:endParaRPr lang="en-US" b="1" dirty="0"/>
           </a:p>
         </p:txBody>
       </p:sp>
@@ -17509,59 +17615,59 @@
             <a:avLst/>
             <a:gdLst>
               <a:gd name="connsiteX0" fmla="*/ 0 w 6925844"/>
-              <a:gd name="connsiteY0" fmla="*/ 0 h 230832"/>
+              <a:gd name="connsiteY0" fmla="*/ 0 h 299117"/>
               <a:gd name="connsiteX1" fmla="*/ 577154 w 6925844"/>
-              <a:gd name="connsiteY1" fmla="*/ 0 h 230832"/>
+              <a:gd name="connsiteY1" fmla="*/ 0 h 299117"/>
               <a:gd name="connsiteX2" fmla="*/ 1223566 w 6925844"/>
-              <a:gd name="connsiteY2" fmla="*/ 0 h 230832"/>
+              <a:gd name="connsiteY2" fmla="*/ 0 h 299117"/>
               <a:gd name="connsiteX3" fmla="*/ 1869978 w 6925844"/>
-              <a:gd name="connsiteY3" fmla="*/ 0 h 230832"/>
+              <a:gd name="connsiteY3" fmla="*/ 0 h 299117"/>
               <a:gd name="connsiteX4" fmla="*/ 2516390 w 6925844"/>
-              <a:gd name="connsiteY4" fmla="*/ 0 h 230832"/>
+              <a:gd name="connsiteY4" fmla="*/ 0 h 299117"/>
               <a:gd name="connsiteX5" fmla="*/ 2885768 w 6925844"/>
-              <a:gd name="connsiteY5" fmla="*/ 0 h 230832"/>
+              <a:gd name="connsiteY5" fmla="*/ 0 h 299117"/>
               <a:gd name="connsiteX6" fmla="*/ 3324405 w 6925844"/>
-              <a:gd name="connsiteY6" fmla="*/ 0 h 230832"/>
+              <a:gd name="connsiteY6" fmla="*/ 0 h 299117"/>
               <a:gd name="connsiteX7" fmla="*/ 4040076 w 6925844"/>
-              <a:gd name="connsiteY7" fmla="*/ 0 h 230832"/>
+              <a:gd name="connsiteY7" fmla="*/ 0 h 299117"/>
               <a:gd name="connsiteX8" fmla="*/ 4617229 w 6925844"/>
-              <a:gd name="connsiteY8" fmla="*/ 0 h 230832"/>
+              <a:gd name="connsiteY8" fmla="*/ 0 h 299117"/>
               <a:gd name="connsiteX9" fmla="*/ 4986608 w 6925844"/>
-              <a:gd name="connsiteY9" fmla="*/ 0 h 230832"/>
+              <a:gd name="connsiteY9" fmla="*/ 0 h 299117"/>
               <a:gd name="connsiteX10" fmla="*/ 5355986 w 6925844"/>
-              <a:gd name="connsiteY10" fmla="*/ 0 h 230832"/>
+              <a:gd name="connsiteY10" fmla="*/ 0 h 299117"/>
               <a:gd name="connsiteX11" fmla="*/ 5794623 w 6925844"/>
-              <a:gd name="connsiteY11" fmla="*/ 0 h 230832"/>
+              <a:gd name="connsiteY11" fmla="*/ 0 h 299117"/>
               <a:gd name="connsiteX12" fmla="*/ 6925844 w 6925844"/>
-              <a:gd name="connsiteY12" fmla="*/ 0 h 230832"/>
+              <a:gd name="connsiteY12" fmla="*/ 0 h 299117"/>
               <a:gd name="connsiteX13" fmla="*/ 6925844 w 6925844"/>
-              <a:gd name="connsiteY13" fmla="*/ 230832 h 230832"/>
+              <a:gd name="connsiteY13" fmla="*/ 299117 h 299117"/>
               <a:gd name="connsiteX14" fmla="*/ 6417949 w 6925844"/>
-              <a:gd name="connsiteY14" fmla="*/ 230832 h 230832"/>
+              <a:gd name="connsiteY14" fmla="*/ 299117 h 299117"/>
               <a:gd name="connsiteX15" fmla="*/ 5702278 w 6925844"/>
-              <a:gd name="connsiteY15" fmla="*/ 230832 h 230832"/>
+              <a:gd name="connsiteY15" fmla="*/ 299117 h 299117"/>
               <a:gd name="connsiteX16" fmla="*/ 4986608 w 6925844"/>
-              <a:gd name="connsiteY16" fmla="*/ 230832 h 230832"/>
+              <a:gd name="connsiteY16" fmla="*/ 299117 h 299117"/>
               <a:gd name="connsiteX17" fmla="*/ 4617229 w 6925844"/>
-              <a:gd name="connsiteY17" fmla="*/ 230832 h 230832"/>
+              <a:gd name="connsiteY17" fmla="*/ 299117 h 299117"/>
               <a:gd name="connsiteX18" fmla="*/ 3901559 w 6925844"/>
-              <a:gd name="connsiteY18" fmla="*/ 230832 h 230832"/>
+              <a:gd name="connsiteY18" fmla="*/ 299117 h 299117"/>
               <a:gd name="connsiteX19" fmla="*/ 3185888 w 6925844"/>
-              <a:gd name="connsiteY19" fmla="*/ 230832 h 230832"/>
+              <a:gd name="connsiteY19" fmla="*/ 299117 h 299117"/>
               <a:gd name="connsiteX20" fmla="*/ 2677993 w 6925844"/>
-              <a:gd name="connsiteY20" fmla="*/ 230832 h 230832"/>
+              <a:gd name="connsiteY20" fmla="*/ 299117 h 299117"/>
               <a:gd name="connsiteX21" fmla="*/ 2100839 w 6925844"/>
-              <a:gd name="connsiteY21" fmla="*/ 230832 h 230832"/>
+              <a:gd name="connsiteY21" fmla="*/ 299117 h 299117"/>
               <a:gd name="connsiteX22" fmla="*/ 1731461 w 6925844"/>
-              <a:gd name="connsiteY22" fmla="*/ 230832 h 230832"/>
+              <a:gd name="connsiteY22" fmla="*/ 299117 h 299117"/>
               <a:gd name="connsiteX23" fmla="*/ 1292824 w 6925844"/>
-              <a:gd name="connsiteY23" fmla="*/ 230832 h 230832"/>
+              <a:gd name="connsiteY23" fmla="*/ 299117 h 299117"/>
               <a:gd name="connsiteX24" fmla="*/ 784929 w 6925844"/>
-              <a:gd name="connsiteY24" fmla="*/ 230832 h 230832"/>
+              <a:gd name="connsiteY24" fmla="*/ 299117 h 299117"/>
               <a:gd name="connsiteX25" fmla="*/ 0 w 6925844"/>
-              <a:gd name="connsiteY25" fmla="*/ 230832 h 230832"/>
+              <a:gd name="connsiteY25" fmla="*/ 299117 h 299117"/>
               <a:gd name="connsiteX26" fmla="*/ 0 w 6925844"/>
-              <a:gd name="connsiteY26" fmla="*/ 0 h 230832"/>
+              <a:gd name="connsiteY26" fmla="*/ 0 h 299117"/>
             </a:gdLst>
             <a:ahLst/>
             <a:cxnLst>
@@ -17649,7 +17755,7 @@
             </a:cxnLst>
             <a:rect l="l" t="t" r="r" b="b"/>
             <a:pathLst>
-              <a:path w="6925844" h="230832" extrusionOk="0">
+              <a:path w="6925844" h="299117" extrusionOk="0">
                 <a:moveTo>
                   <a:pt x="0" y="0"/>
                 </a:moveTo>
@@ -17714,73 +17820,73 @@
                   <a:pt x="6925844" y="0"/>
                 </a:cubicBezTo>
                 <a:cubicBezTo>
-                  <a:pt x="6949942" y="78725"/>
-                  <a:pt x="6900374" y="174976"/>
-                  <a:pt x="6925844" y="230832"/>
+                  <a:pt x="6957981" y="88345"/>
+                  <a:pt x="6892383" y="225452"/>
+                  <a:pt x="6925844" y="299117"/>
                 </a:cubicBezTo>
                 <a:cubicBezTo>
-                  <a:pt x="6722106" y="244434"/>
-                  <a:pt x="6606470" y="177741"/>
-                  <a:pt x="6417949" y="230832"/>
+                  <a:pt x="6722106" y="312719"/>
+                  <a:pt x="6606470" y="246026"/>
+                  <a:pt x="6417949" y="299117"/>
                 </a:cubicBezTo>
                 <a:cubicBezTo>
-                  <a:pt x="6229428" y="283923"/>
-                  <a:pt x="6039688" y="203771"/>
-                  <a:pt x="5702278" y="230832"/>
+                  <a:pt x="6229428" y="352208"/>
+                  <a:pt x="6039688" y="272056"/>
+                  <a:pt x="5702278" y="299117"/>
                 </a:cubicBezTo>
                 <a:cubicBezTo>
-                  <a:pt x="5364868" y="257893"/>
-                  <a:pt x="5246735" y="171512"/>
-                  <a:pt x="4986608" y="230832"/>
+                  <a:pt x="5364868" y="326178"/>
+                  <a:pt x="5246735" y="239797"/>
+                  <a:pt x="4986608" y="299117"/>
                 </a:cubicBezTo>
                 <a:cubicBezTo>
-                  <a:pt x="4726481" y="290152"/>
-                  <a:pt x="4728596" y="222285"/>
-                  <a:pt x="4617229" y="230832"/>
+                  <a:pt x="4726481" y="358437"/>
+                  <a:pt x="4728596" y="290570"/>
+                  <a:pt x="4617229" y="299117"/>
                 </a:cubicBezTo>
                 <a:cubicBezTo>
-                  <a:pt x="4505862" y="239379"/>
-                  <a:pt x="4085985" y="228664"/>
-                  <a:pt x="3901559" y="230832"/>
+                  <a:pt x="4505862" y="307664"/>
+                  <a:pt x="4085985" y="296949"/>
+                  <a:pt x="3901559" y="299117"/>
                 </a:cubicBezTo>
                 <a:cubicBezTo>
-                  <a:pt x="3717133" y="233000"/>
-                  <a:pt x="3494933" y="160527"/>
-                  <a:pt x="3185888" y="230832"/>
+                  <a:pt x="3717133" y="301285"/>
+                  <a:pt x="3494933" y="228812"/>
+                  <a:pt x="3185888" y="299117"/>
                 </a:cubicBezTo>
                 <a:cubicBezTo>
-                  <a:pt x="2876843" y="301137"/>
-                  <a:pt x="2793971" y="179388"/>
-                  <a:pt x="2677993" y="230832"/>
+                  <a:pt x="2876843" y="369422"/>
+                  <a:pt x="2793971" y="247673"/>
+                  <a:pt x="2677993" y="299117"/>
                 </a:cubicBezTo>
                 <a:cubicBezTo>
-                  <a:pt x="2562015" y="282276"/>
-                  <a:pt x="2333851" y="183582"/>
-                  <a:pt x="2100839" y="230832"/>
+                  <a:pt x="2562015" y="350561"/>
+                  <a:pt x="2333851" y="251867"/>
+                  <a:pt x="2100839" y="299117"/>
                 </a:cubicBezTo>
                 <a:cubicBezTo>
-                  <a:pt x="1867827" y="278082"/>
-                  <a:pt x="1914458" y="222143"/>
-                  <a:pt x="1731461" y="230832"/>
+                  <a:pt x="1867827" y="346367"/>
+                  <a:pt x="1914458" y="290428"/>
+                  <a:pt x="1731461" y="299117"/>
                 </a:cubicBezTo>
                 <a:cubicBezTo>
-                  <a:pt x="1548464" y="239521"/>
-                  <a:pt x="1392417" y="201609"/>
-                  <a:pt x="1292824" y="230832"/>
+                  <a:pt x="1548464" y="307806"/>
+                  <a:pt x="1392417" y="269894"/>
+                  <a:pt x="1292824" y="299117"/>
                 </a:cubicBezTo>
                 <a:cubicBezTo>
-                  <a:pt x="1193231" y="260055"/>
-                  <a:pt x="965645" y="202285"/>
-                  <a:pt x="784929" y="230832"/>
+                  <a:pt x="1193231" y="328340"/>
+                  <a:pt x="965645" y="270570"/>
+                  <a:pt x="784929" y="299117"/>
                 </a:cubicBezTo>
                 <a:cubicBezTo>
-                  <a:pt x="604213" y="259379"/>
-                  <a:pt x="345294" y="188420"/>
-                  <a:pt x="0" y="230832"/>
+                  <a:pt x="604213" y="327664"/>
+                  <a:pt x="345294" y="256705"/>
+                  <a:pt x="0" y="299117"/>
                 </a:cubicBezTo>
                 <a:cubicBezTo>
-                  <a:pt x="-20577" y="134385"/>
-                  <a:pt x="8512" y="105670"/>
+                  <a:pt x="-26879" y="235877"/>
+                  <a:pt x="21666" y="137087"/>
                   <a:pt x="0" y="0"/>
                 </a:cubicBezTo>
                 <a:close/>
@@ -17794,7 +17900,7 @@
             </a:solidFill>
             <a:extLst>
               <a:ext uri="{C807C97D-BFC1-408E-A445-0C87EB9F89A2}">
-                <ask:lineSketchStyleProps xmlns:ask="http://schemas.microsoft.com/office/drawing/2018/sketchyshapes" xmlns="" sd="3997106322">
+                <ask:lineSketchStyleProps xmlns:ask="http://schemas.microsoft.com/office/drawing/2018/sketchyshapes" sd="3997106322">
                   <a:prstGeom prst="rect">
                     <a:avLst/>
                   </a:prstGeom>

</xml_diff>